<commit_message>
make chnages in ppt
</commit_message>
<xml_diff>
--- a/Reimbursement Portal-1.pptx
+++ b/Reimbursement Portal-1.pptx
@@ -15,20 +15,21 @@
     <p:sldId id="260" r:id="rId8"/>
     <p:sldId id="261" r:id="rId9"/>
     <p:sldId id="262" r:id="rId10"/>
-    <p:sldId id="263" r:id="rId11"/>
-    <p:sldId id="264" r:id="rId12"/>
-    <p:sldId id="265" r:id="rId13"/>
-    <p:sldId id="266" r:id="rId14"/>
-    <p:sldId id="267" r:id="rId15"/>
-    <p:sldId id="268" r:id="rId16"/>
-    <p:sldId id="269" r:id="rId17"/>
-    <p:sldId id="270" r:id="rId18"/>
-    <p:sldId id="271" r:id="rId19"/>
-    <p:sldId id="272" r:id="rId20"/>
-    <p:sldId id="273" r:id="rId21"/>
-    <p:sldId id="274" r:id="rId22"/>
-    <p:sldId id="275" r:id="rId23"/>
-    <p:sldId id="276" r:id="rId24"/>
+    <p:sldId id="277" r:id="rId11"/>
+    <p:sldId id="263" r:id="rId12"/>
+    <p:sldId id="264" r:id="rId13"/>
+    <p:sldId id="265" r:id="rId14"/>
+    <p:sldId id="266" r:id="rId15"/>
+    <p:sldId id="267" r:id="rId16"/>
+    <p:sldId id="268" r:id="rId17"/>
+    <p:sldId id="269" r:id="rId18"/>
+    <p:sldId id="270" r:id="rId19"/>
+    <p:sldId id="271" r:id="rId20"/>
+    <p:sldId id="272" r:id="rId21"/>
+    <p:sldId id="273" r:id="rId22"/>
+    <p:sldId id="274" r:id="rId23"/>
+    <p:sldId id="275" r:id="rId24"/>
+    <p:sldId id="276" r:id="rId25"/>
   </p:sldIdLst>
   <p:sldSz cx="9144000" cy="5143500"/>
   <p:notesSz cx="6858000" cy="9144000"/>
@@ -7831,6 +7832,139 @@
   <p:cSld>
     <p:spTree>
       <p:nvGrpSpPr>
+        <p:cNvPr id="98" name="Shape 98"/>
+        <p:cNvGrpSpPr/>
+        <p:nvPr/>
+      </p:nvGrpSpPr>
+      <p:grpSpPr>
+        <a:xfrm>
+          <a:off x="0" y="0"/>
+          <a:ext cx="0" cy="0"/>
+          <a:chOff x="0" y="0"/>
+          <a:chExt cx="0" cy="0"/>
+        </a:xfrm>
+      </p:grpSpPr>
+      <p:sp>
+        <p:nvSpPr>
+          <p:cNvPr id="99" name="Google Shape;99;p21"/>
+          <p:cNvSpPr txBox="1"/>
+          <p:nvPr/>
+        </p:nvSpPr>
+        <p:spPr>
+          <a:xfrm>
+            <a:off x="2100188" y="108750"/>
+            <a:ext cx="4667400" cy="628800"/>
+          </a:xfrm>
+          <a:prstGeom prst="rect">
+            <a:avLst/>
+          </a:prstGeom>
+          <a:noFill/>
+          <a:ln>
+            <a:noFill/>
+          </a:ln>
+        </p:spPr>
+        <p:txBody>
+          <a:bodyPr spcFirstLastPara="1" wrap="square" lIns="91425" tIns="91425" rIns="91425" bIns="91425" anchor="t" anchorCtr="0">
+            <a:noAutofit/>
+          </a:bodyPr>
+          <a:lstStyle/>
+          <a:p>
+            <a:pPr marL="0" lvl="0" indent="0" algn="l" rtl="0">
+              <a:spcBef>
+                <a:spcPts val="0"/>
+              </a:spcBef>
+              <a:spcAft>
+                <a:spcPts val="0"/>
+              </a:spcAft>
+              <a:buNone/>
+            </a:pPr>
+            <a:r>
+              <a:rPr lang="en-GB" sz="2800">
+                <a:solidFill>
+                  <a:schemeClr val="dk1"/>
+                </a:solidFill>
+                <a:latin typeface="Times New Roman" panose="02020603050405020304"/>
+                <a:ea typeface="Times New Roman" panose="02020603050405020304"/>
+                <a:cs typeface="Times New Roman" panose="02020603050405020304"/>
+                <a:sym typeface="Times New Roman" panose="02020603050405020304"/>
+              </a:rPr>
+              <a:t>Reimbursement_request</a:t>
+            </a:r>
+            <a:r>
+              <a:rPr lang="en-GB" sz="2800">
+                <a:solidFill>
+                  <a:schemeClr val="dk1"/>
+                </a:solidFill>
+                <a:latin typeface="Times New Roman" panose="02020603050405020304"/>
+                <a:ea typeface="Times New Roman" panose="02020603050405020304"/>
+                <a:cs typeface="Times New Roman" panose="02020603050405020304"/>
+                <a:sym typeface="Times New Roman" panose="02020603050405020304"/>
+              </a:rPr>
+              <a:t> Model</a:t>
+            </a:r>
+            <a:endParaRPr sz="2800">
+              <a:solidFill>
+                <a:schemeClr val="dk1"/>
+              </a:solidFill>
+              <a:latin typeface="Times New Roman" panose="02020603050405020304"/>
+              <a:ea typeface="Times New Roman" panose="02020603050405020304"/>
+              <a:cs typeface="Times New Roman" panose="02020603050405020304"/>
+              <a:sym typeface="Times New Roman" panose="02020603050405020304"/>
+            </a:endParaRPr>
+          </a:p>
+        </p:txBody>
+      </p:sp>
+      <p:pic>
+        <p:nvPicPr>
+          <p:cNvPr id="100" name="Google Shape;100;p21"/>
+          <p:cNvPicPr preferRelativeResize="0"/>
+          <p:nvPr/>
+        </p:nvPicPr>
+        <p:blipFill>
+          <a:blip r:embed="rId1"/>
+          <a:stretch>
+            <a:fillRect/>
+          </a:stretch>
+        </p:blipFill>
+        <p:spPr>
+          <a:xfrm>
+            <a:off x="1030075" y="873625"/>
+            <a:ext cx="6943724" cy="4051150"/>
+          </a:xfrm>
+          <a:prstGeom prst="rect">
+            <a:avLst/>
+          </a:prstGeom>
+          <a:noFill/>
+          <a:ln>
+            <a:noFill/>
+          </a:ln>
+        </p:spPr>
+      </p:pic>
+    </p:spTree>
+  </p:cSld>
+  <p:clrMapOvr>
+    <a:masterClrMapping/>
+  </p:clrMapOvr>
+  <mc:AlternateContent xmlns:mc="http://schemas.openxmlformats.org/markup-compatibility/2006">
+    <mc:Choice xmlns:p14="http://schemas.microsoft.com/office/powerpoint/2010/main" Requires="p14">
+      <p:transition spd="slow" p14:dur="1100">
+        <p14:gallery dir="l"/>
+      </p:transition>
+    </mc:Choice>
+    <mc:Fallback>
+      <p:transition spd="slow">
+        <p:fade/>
+      </p:transition>
+    </mc:Fallback>
+  </mc:AlternateContent>
+</p:sld>
+</file>
+
+<file path=ppt/slides/slide11.xml><?xml version="1.0" encoding="utf-8"?>
+<p:sld xmlns:a="http://schemas.openxmlformats.org/drawingml/2006/main" xmlns:r="http://schemas.openxmlformats.org/officeDocument/2006/relationships" xmlns:p="http://schemas.openxmlformats.org/presentationml/2006/main">
+  <p:cSld>
+    <p:spTree>
+      <p:nvGrpSpPr>
         <p:cNvPr id="104" name="Shape 104"/>
         <p:cNvGrpSpPr/>
         <p:nvPr/>
@@ -8001,7 +8135,7 @@
 </p:sld>
 </file>
 
-<file path=ppt/slides/slide11.xml><?xml version="1.0" encoding="utf-8"?>
+<file path=ppt/slides/slide12.xml><?xml version="1.0" encoding="utf-8"?>
 <p:sld xmlns:a="http://schemas.openxmlformats.org/drawingml/2006/main" xmlns:r="http://schemas.openxmlformats.org/officeDocument/2006/relationships" xmlns:p="http://schemas.openxmlformats.org/presentationml/2006/main">
   <p:cSld>
     <p:spTree>
@@ -8411,7 +8545,7 @@
 </p:sld>
 </file>
 
-<file path=ppt/slides/slide12.xml><?xml version="1.0" encoding="utf-8"?>
+<file path=ppt/slides/slide13.xml><?xml version="1.0" encoding="utf-8"?>
 <p:sld xmlns:a="http://schemas.openxmlformats.org/drawingml/2006/main" xmlns:r="http://schemas.openxmlformats.org/officeDocument/2006/relationships" xmlns:p="http://schemas.openxmlformats.org/presentationml/2006/main">
   <p:cSld>
     <p:spTree>
@@ -8474,7 +8608,7 @@
 </p:sld>
 </file>
 
-<file path=ppt/slides/slide13.xml><?xml version="1.0" encoding="utf-8"?>
+<file path=ppt/slides/slide14.xml><?xml version="1.0" encoding="utf-8"?>
 <p:sld xmlns:a="http://schemas.openxmlformats.org/drawingml/2006/main" xmlns:r="http://schemas.openxmlformats.org/officeDocument/2006/relationships" xmlns:p="http://schemas.openxmlformats.org/presentationml/2006/main">
   <p:cSld>
     <p:spTree>
@@ -8778,7 +8912,7 @@
               </a:rPr>
               <a:t>	Logging module for generating application logs</a:t>
             </a:r>
-            <a:endParaRPr sz="1800">
+            <a:endParaRPr lang="en-GB" sz="1800">
               <a:solidFill>
                 <a:schemeClr val="dk1"/>
               </a:solidFill>
@@ -8789,7 +8923,7 @@
             </a:endParaRPr>
           </a:p>
           <a:p>
-            <a:pPr marL="457200" lvl="0" indent="-342900" algn="l" rtl="0">
+            <a:pPr marL="114300" lvl="0" indent="0" algn="l" rtl="0">
               <a:lnSpc>
                 <a:spcPct val="150000"/>
               </a:lnSpc>
@@ -8804,20 +8938,8 @@
               </a:buClr>
               <a:buSzPts val="1800"/>
               <a:buFont typeface="Times New Roman" panose="02020603050405020304"/>
-              <a:buChar char="●"/>
+              <a:buNone/>
             </a:pPr>
-            <a:r>
-              <a:rPr lang="en-GB" sz="1800">
-                <a:solidFill>
-                  <a:schemeClr val="dk1"/>
-                </a:solidFill>
-                <a:latin typeface="Times New Roman" panose="02020603050405020304"/>
-                <a:ea typeface="Times New Roman" panose="02020603050405020304"/>
-                <a:cs typeface="Times New Roman" panose="02020603050405020304"/>
-                <a:sym typeface="Times New Roman" panose="02020603050405020304"/>
-              </a:rPr>
-              <a:t>        UnitTest framework for testing.</a:t>
-            </a:r>
             <a:endParaRPr sz="1800">
               <a:solidFill>
                 <a:schemeClr val="dk1"/>
@@ -8891,7 +9013,19 @@
                 <a:cs typeface="Times New Roman" panose="02020603050405020304"/>
                 <a:sym typeface="Times New Roman" panose="02020603050405020304"/>
               </a:rPr>
-              <a:t>    	REST API developed in Python</a:t>
+              <a:t>    	REST API developed in </a:t>
+            </a:r>
+            <a:r>
+              <a:rPr lang="en-US" altLang="en-GB" sz="1800">
+                <a:solidFill>
+                  <a:schemeClr val="dk1"/>
+                </a:solidFill>
+                <a:latin typeface="Times New Roman" panose="02020603050405020304"/>
+                <a:ea typeface="Times New Roman" panose="02020603050405020304"/>
+                <a:cs typeface="Times New Roman" panose="02020603050405020304"/>
+                <a:sym typeface="Times New Roman" panose="02020603050405020304"/>
+              </a:rPr>
+              <a:t>Flask</a:t>
             </a:r>
             <a:endParaRPr sz="1800">
               <a:solidFill>
@@ -8965,7 +9099,7 @@
 </p:sld>
 </file>
 
-<file path=ppt/slides/slide14.xml><?xml version="1.0" encoding="utf-8"?>
+<file path=ppt/slides/slide15.xml><?xml version="1.0" encoding="utf-8"?>
 <p:sld xmlns:a="http://schemas.openxmlformats.org/drawingml/2006/main" xmlns:r="http://schemas.openxmlformats.org/officeDocument/2006/relationships" xmlns:p="http://schemas.openxmlformats.org/presentationml/2006/main">
   <p:cSld>
     <p:spTree>
@@ -9202,7 +9336,7 @@
 </p:sld>
 </file>
 
-<file path=ppt/slides/slide15.xml><?xml version="1.0" encoding="utf-8"?>
+<file path=ppt/slides/slide16.xml><?xml version="1.0" encoding="utf-8"?>
 <p:sld xmlns:a="http://schemas.openxmlformats.org/drawingml/2006/main" xmlns:r="http://schemas.openxmlformats.org/officeDocument/2006/relationships" xmlns:p="http://schemas.openxmlformats.org/presentationml/2006/main">
   <p:cSld>
     <p:spTree>
@@ -9323,7 +9457,7 @@
 </p:sld>
 </file>
 
-<file path=ppt/slides/slide16.xml><?xml version="1.0" encoding="utf-8"?>
+<file path=ppt/slides/slide17.xml><?xml version="1.0" encoding="utf-8"?>
 <p:sld xmlns:a="http://schemas.openxmlformats.org/drawingml/2006/main" xmlns:r="http://schemas.openxmlformats.org/officeDocument/2006/relationships" xmlns:p="http://schemas.openxmlformats.org/presentationml/2006/main">
   <p:cSld>
     <p:spTree>
@@ -9444,7 +9578,7 @@
 </p:sld>
 </file>
 
-<file path=ppt/slides/slide17.xml><?xml version="1.0" encoding="utf-8"?>
+<file path=ppt/slides/slide18.xml><?xml version="1.0" encoding="utf-8"?>
 <p:sld xmlns:a="http://schemas.openxmlformats.org/drawingml/2006/main" xmlns:r="http://schemas.openxmlformats.org/officeDocument/2006/relationships" xmlns:p="http://schemas.openxmlformats.org/presentationml/2006/main">
   <p:cSld>
     <p:spTree>
@@ -9565,7 +9699,7 @@
 </p:sld>
 </file>
 
-<file path=ppt/slides/slide18.xml><?xml version="1.0" encoding="utf-8"?>
+<file path=ppt/slides/slide19.xml><?xml version="1.0" encoding="utf-8"?>
 <p:sld xmlns:a="http://schemas.openxmlformats.org/drawingml/2006/main" xmlns:r="http://schemas.openxmlformats.org/officeDocument/2006/relationships" xmlns:p="http://schemas.openxmlformats.org/presentationml/2006/main">
   <p:cSld>
     <p:spTree>
@@ -9642,7 +9776,7 @@
       </p:sp>
       <p:pic>
         <p:nvPicPr>
-          <p:cNvPr id="1" name="Picture 0" descr="Screenshot 2024-06-05 at 02-00-57 Reimbursement Portal"/>
+          <p:cNvPr id="2" name="Picture 1" descr="Screenshot 2024-06-05 at 02-00-57 Reimbursement Portal"/>
           <p:cNvPicPr>
             <a:picLocks noChangeAspect="1"/>
           </p:cNvPicPr>
@@ -9658,125 +9792,6 @@
           <a:xfrm>
             <a:off x="814705" y="766445"/>
             <a:ext cx="7498715" cy="4255770"/>
-          </a:xfrm>
-          <a:prstGeom prst="rect">
-            <a:avLst/>
-          </a:prstGeom>
-        </p:spPr>
-      </p:pic>
-    </p:spTree>
-  </p:cSld>
-  <p:clrMapOvr>
-    <a:masterClrMapping/>
-  </p:clrMapOvr>
-  <mc:AlternateContent xmlns:mc="http://schemas.openxmlformats.org/markup-compatibility/2006">
-    <mc:Choice xmlns:p14="http://schemas.microsoft.com/office/powerpoint/2010/main" Requires="p14">
-      <p:transition spd="slow" p14:dur="1100">
-        <p14:gallery dir="l"/>
-      </p:transition>
-    </mc:Choice>
-    <mc:Fallback>
-      <p:transition spd="slow">
-        <p:fade/>
-      </p:transition>
-    </mc:Fallback>
-  </mc:AlternateContent>
-</p:sld>
-</file>
-
-<file path=ppt/slides/slide19.xml><?xml version="1.0" encoding="utf-8"?>
-<p:sld xmlns:a="http://schemas.openxmlformats.org/drawingml/2006/main" xmlns:r="http://schemas.openxmlformats.org/officeDocument/2006/relationships" xmlns:p="http://schemas.openxmlformats.org/presentationml/2006/main">
-  <p:cSld>
-    <p:spTree>
-      <p:nvGrpSpPr>
-        <p:cNvPr id="158" name="Shape 158"/>
-        <p:cNvGrpSpPr/>
-        <p:nvPr/>
-      </p:nvGrpSpPr>
-      <p:grpSpPr>
-        <a:xfrm>
-          <a:off x="0" y="0"/>
-          <a:ext cx="0" cy="0"/>
-          <a:chOff x="0" y="0"/>
-          <a:chExt cx="0" cy="0"/>
-        </a:xfrm>
-      </p:grpSpPr>
-      <p:sp>
-        <p:nvSpPr>
-          <p:cNvPr id="159" name="Google Shape;159;p31"/>
-          <p:cNvSpPr txBox="1"/>
-          <p:nvPr/>
-        </p:nvSpPr>
-        <p:spPr>
-          <a:xfrm>
-            <a:off x="2057400" y="157000"/>
-            <a:ext cx="5057700" cy="628800"/>
-          </a:xfrm>
-          <a:prstGeom prst="rect">
-            <a:avLst/>
-          </a:prstGeom>
-          <a:noFill/>
-          <a:ln>
-            <a:noFill/>
-          </a:ln>
-        </p:spPr>
-        <p:txBody>
-          <a:bodyPr spcFirstLastPara="1" wrap="square" lIns="91425" tIns="91425" rIns="91425" bIns="91425" anchor="t" anchorCtr="0">
-            <a:noAutofit/>
-          </a:bodyPr>
-          <a:lstStyle/>
-          <a:p>
-            <a:pPr marL="0" lvl="0" indent="0" algn="l" rtl="0">
-              <a:spcBef>
-                <a:spcPts val="0"/>
-              </a:spcBef>
-              <a:spcAft>
-                <a:spcPts val="0"/>
-              </a:spcAft>
-              <a:buNone/>
-            </a:pPr>
-            <a:r>
-              <a:rPr lang="en-GB" sz="2800">
-                <a:solidFill>
-                  <a:schemeClr val="dk1"/>
-                </a:solidFill>
-                <a:latin typeface="Times New Roman" panose="02020603050405020304"/>
-                <a:ea typeface="Times New Roman" panose="02020603050405020304"/>
-                <a:cs typeface="Times New Roman" panose="02020603050405020304"/>
-                <a:sym typeface="Times New Roman" panose="02020603050405020304"/>
-              </a:rPr>
-              <a:t>Snapshot of Manager Dashboard</a:t>
-            </a:r>
-            <a:endParaRPr sz="2800">
-              <a:solidFill>
-                <a:schemeClr val="dk1"/>
-              </a:solidFill>
-              <a:latin typeface="Times New Roman" panose="02020603050405020304"/>
-              <a:ea typeface="Times New Roman" panose="02020603050405020304"/>
-              <a:cs typeface="Times New Roman" panose="02020603050405020304"/>
-              <a:sym typeface="Times New Roman" panose="02020603050405020304"/>
-            </a:endParaRPr>
-          </a:p>
-        </p:txBody>
-      </p:sp>
-      <p:pic>
-        <p:nvPicPr>
-          <p:cNvPr id="1" name="Picture 0" descr="Screenshot 2024-06-05 at 01-59-21 Reimbursement Portal"/>
-          <p:cNvPicPr>
-            <a:picLocks noChangeAspect="1"/>
-          </p:cNvPicPr>
-          <p:nvPr/>
-        </p:nvPicPr>
-        <p:blipFill>
-          <a:blip r:embed="rId1"/>
-          <a:stretch>
-            <a:fillRect/>
-          </a:stretch>
-        </p:blipFill>
-        <p:spPr>
-          <a:xfrm>
-            <a:off x="892810" y="785495"/>
-            <a:ext cx="7372985" cy="4214495"/>
           </a:xfrm>
           <a:prstGeom prst="rect">
             <a:avLst/>
@@ -10052,6 +10067,125 @@
   <p:cSld>
     <p:spTree>
       <p:nvGrpSpPr>
+        <p:cNvPr id="158" name="Shape 158"/>
+        <p:cNvGrpSpPr/>
+        <p:nvPr/>
+      </p:nvGrpSpPr>
+      <p:grpSpPr>
+        <a:xfrm>
+          <a:off x="0" y="0"/>
+          <a:ext cx="0" cy="0"/>
+          <a:chOff x="0" y="0"/>
+          <a:chExt cx="0" cy="0"/>
+        </a:xfrm>
+      </p:grpSpPr>
+      <p:sp>
+        <p:nvSpPr>
+          <p:cNvPr id="159" name="Google Shape;159;p31"/>
+          <p:cNvSpPr txBox="1"/>
+          <p:nvPr/>
+        </p:nvSpPr>
+        <p:spPr>
+          <a:xfrm>
+            <a:off x="2057400" y="157000"/>
+            <a:ext cx="5057700" cy="628800"/>
+          </a:xfrm>
+          <a:prstGeom prst="rect">
+            <a:avLst/>
+          </a:prstGeom>
+          <a:noFill/>
+          <a:ln>
+            <a:noFill/>
+          </a:ln>
+        </p:spPr>
+        <p:txBody>
+          <a:bodyPr spcFirstLastPara="1" wrap="square" lIns="91425" tIns="91425" rIns="91425" bIns="91425" anchor="t" anchorCtr="0">
+            <a:noAutofit/>
+          </a:bodyPr>
+          <a:lstStyle/>
+          <a:p>
+            <a:pPr marL="0" lvl="0" indent="0" algn="l" rtl="0">
+              <a:spcBef>
+                <a:spcPts val="0"/>
+              </a:spcBef>
+              <a:spcAft>
+                <a:spcPts val="0"/>
+              </a:spcAft>
+              <a:buNone/>
+            </a:pPr>
+            <a:r>
+              <a:rPr lang="en-GB" sz="2800">
+                <a:solidFill>
+                  <a:schemeClr val="dk1"/>
+                </a:solidFill>
+                <a:latin typeface="Times New Roman" panose="02020603050405020304"/>
+                <a:ea typeface="Times New Roman" panose="02020603050405020304"/>
+                <a:cs typeface="Times New Roman" panose="02020603050405020304"/>
+                <a:sym typeface="Times New Roman" panose="02020603050405020304"/>
+              </a:rPr>
+              <a:t>Snapshot of Manager Dashboard</a:t>
+            </a:r>
+            <a:endParaRPr sz="2800">
+              <a:solidFill>
+                <a:schemeClr val="dk1"/>
+              </a:solidFill>
+              <a:latin typeface="Times New Roman" panose="02020603050405020304"/>
+              <a:ea typeface="Times New Roman" panose="02020603050405020304"/>
+              <a:cs typeface="Times New Roman" panose="02020603050405020304"/>
+              <a:sym typeface="Times New Roman" panose="02020603050405020304"/>
+            </a:endParaRPr>
+          </a:p>
+        </p:txBody>
+      </p:sp>
+      <p:pic>
+        <p:nvPicPr>
+          <p:cNvPr id="2" name="Picture 1" descr="Screenshot 2024-06-05 at 01-59-21 Reimbursement Portal"/>
+          <p:cNvPicPr>
+            <a:picLocks noChangeAspect="1"/>
+          </p:cNvPicPr>
+          <p:nvPr/>
+        </p:nvPicPr>
+        <p:blipFill>
+          <a:blip r:embed="rId1"/>
+          <a:stretch>
+            <a:fillRect/>
+          </a:stretch>
+        </p:blipFill>
+        <p:spPr>
+          <a:xfrm>
+            <a:off x="892810" y="785495"/>
+            <a:ext cx="7372985" cy="4214495"/>
+          </a:xfrm>
+          <a:prstGeom prst="rect">
+            <a:avLst/>
+          </a:prstGeom>
+        </p:spPr>
+      </p:pic>
+    </p:spTree>
+  </p:cSld>
+  <p:clrMapOvr>
+    <a:masterClrMapping/>
+  </p:clrMapOvr>
+  <mc:AlternateContent xmlns:mc="http://schemas.openxmlformats.org/markup-compatibility/2006">
+    <mc:Choice xmlns:p14="http://schemas.microsoft.com/office/powerpoint/2010/main" Requires="p14">
+      <p:transition spd="slow" p14:dur="1100">
+        <p14:gallery dir="l"/>
+      </p:transition>
+    </mc:Choice>
+    <mc:Fallback>
+      <p:transition spd="slow">
+        <p:fade/>
+      </p:transition>
+    </mc:Fallback>
+  </mc:AlternateContent>
+</p:sld>
+</file>
+
+<file path=ppt/slides/slide21.xml><?xml version="1.0" encoding="utf-8"?>
+<p:sld xmlns:a="http://schemas.openxmlformats.org/drawingml/2006/main" xmlns:r="http://schemas.openxmlformats.org/officeDocument/2006/relationships" xmlns:p="http://schemas.openxmlformats.org/presentationml/2006/main">
+  <p:cSld>
+    <p:spTree>
+      <p:nvGrpSpPr>
         <p:cNvPr id="164" name="Shape 164"/>
         <p:cNvGrpSpPr/>
         <p:nvPr/>
@@ -10166,7 +10300,7 @@
 </p:sld>
 </file>
 
-<file path=ppt/slides/slide21.xml><?xml version="1.0" encoding="utf-8"?>
+<file path=ppt/slides/slide22.xml><?xml version="1.0" encoding="utf-8"?>
 <p:sld xmlns:a="http://schemas.openxmlformats.org/drawingml/2006/main" xmlns:r="http://schemas.openxmlformats.org/officeDocument/2006/relationships" xmlns:p="http://schemas.openxmlformats.org/presentationml/2006/main">
   <p:cSld>
     <p:spTree>
@@ -11193,8 +11327,10 @@
       </p:grpSpPr>
       <p:pic>
         <p:nvPicPr>
-          <p:cNvPr id="78" name="Google Shape;78;p17"/>
-          <p:cNvPicPr preferRelativeResize="0"/>
+          <p:cNvPr id="2" name="Picture 1" descr="employee123"/>
+          <p:cNvPicPr>
+            <a:picLocks noChangeAspect="1"/>
+          </p:cNvPicPr>
           <p:nvPr/>
         </p:nvPicPr>
         <p:blipFill>
@@ -11205,8 +11341,24 @@
         </p:blipFill>
         <p:spPr>
           <a:xfrm>
-            <a:off x="182775" y="130550"/>
-            <a:ext cx="8772650" cy="4830176"/>
+            <a:off x="570865" y="902335"/>
+            <a:ext cx="8307070" cy="3967480"/>
+          </a:xfrm>
+          <a:prstGeom prst="rect">
+            <a:avLst/>
+          </a:prstGeom>
+        </p:spPr>
+      </p:pic>
+      <p:sp>
+        <p:nvSpPr>
+          <p:cNvPr id="123" name="Google Shape;123;p25"/>
+          <p:cNvSpPr txBox="1"/>
+          <p:nvPr/>
+        </p:nvSpPr>
+        <p:spPr>
+          <a:xfrm>
+            <a:off x="2793600" y="128425"/>
+            <a:ext cx="3728700" cy="628800"/>
           </a:xfrm>
           <a:prstGeom prst="rect">
             <a:avLst/>
@@ -11216,7 +11368,44 @@
             <a:noFill/>
           </a:ln>
         </p:spPr>
-      </p:pic>
+        <p:txBody>
+          <a:bodyPr spcFirstLastPara="1" wrap="square" lIns="91425" tIns="91425" rIns="91425" bIns="91425" anchor="t" anchorCtr="0">
+            <a:noAutofit/>
+          </a:bodyPr>
+          <a:p>
+            <a:pPr marL="0" lvl="0" indent="0" algn="l" rtl="0">
+              <a:spcBef>
+                <a:spcPts val="0"/>
+              </a:spcBef>
+              <a:spcAft>
+                <a:spcPts val="0"/>
+              </a:spcAft>
+              <a:buNone/>
+            </a:pPr>
+            <a:r>
+              <a:rPr lang="en-US" altLang="en-GB" sz="2800">
+                <a:solidFill>
+                  <a:schemeClr val="dk1"/>
+                </a:solidFill>
+                <a:latin typeface="Times New Roman" panose="02020603050405020304"/>
+                <a:ea typeface="Times New Roman" panose="02020603050405020304"/>
+                <a:cs typeface="Times New Roman" panose="02020603050405020304"/>
+                <a:sym typeface="Times New Roman" panose="02020603050405020304"/>
+              </a:rPr>
+              <a:t>Employee Dashboard</a:t>
+            </a:r>
+            <a:endParaRPr lang="en-US" altLang="en-GB" sz="2800">
+              <a:solidFill>
+                <a:schemeClr val="dk1"/>
+              </a:solidFill>
+              <a:latin typeface="Times New Roman" panose="02020603050405020304"/>
+              <a:ea typeface="Times New Roman" panose="02020603050405020304"/>
+              <a:cs typeface="Times New Roman" panose="02020603050405020304"/>
+              <a:sym typeface="Times New Roman" panose="02020603050405020304"/>
+            </a:endParaRPr>
+          </a:p>
+        </p:txBody>
+      </p:sp>
     </p:spTree>
   </p:cSld>
   <p:clrMapOvr>
@@ -11254,10 +11443,69 @@
           <a:chExt cx="0" cy="0"/>
         </a:xfrm>
       </p:grpSpPr>
+      <p:sp>
+        <p:nvSpPr>
+          <p:cNvPr id="123" name="Google Shape;123;p25"/>
+          <p:cNvSpPr txBox="1"/>
+          <p:nvPr/>
+        </p:nvSpPr>
+        <p:spPr>
+          <a:xfrm>
+            <a:off x="2793365" y="128270"/>
+            <a:ext cx="3138170" cy="628650"/>
+          </a:xfrm>
+          <a:prstGeom prst="rect">
+            <a:avLst/>
+          </a:prstGeom>
+          <a:noFill/>
+          <a:ln>
+            <a:noFill/>
+          </a:ln>
+        </p:spPr>
+        <p:txBody>
+          <a:bodyPr spcFirstLastPara="1" wrap="square" lIns="91425" tIns="91425" rIns="91425" bIns="91425" anchor="t" anchorCtr="0">
+            <a:noAutofit/>
+          </a:bodyPr>
+          <a:p>
+            <a:pPr marL="0" lvl="0" indent="0" algn="l" rtl="0">
+              <a:spcBef>
+                <a:spcPts val="0"/>
+              </a:spcBef>
+              <a:spcAft>
+                <a:spcPts val="0"/>
+              </a:spcAft>
+              <a:buNone/>
+            </a:pPr>
+            <a:r>
+              <a:rPr lang="en-US" altLang="en-GB" sz="2800">
+                <a:solidFill>
+                  <a:schemeClr val="dk1"/>
+                </a:solidFill>
+                <a:latin typeface="Times New Roman" panose="02020603050405020304"/>
+                <a:ea typeface="Times New Roman" panose="02020603050405020304"/>
+                <a:cs typeface="Times New Roman" panose="02020603050405020304"/>
+                <a:sym typeface="Times New Roman" panose="02020603050405020304"/>
+              </a:rPr>
+              <a:t>Manager Dashboard</a:t>
+            </a:r>
+            <a:endParaRPr lang="en-US" altLang="en-GB" sz="2800">
+              <a:solidFill>
+                <a:schemeClr val="dk1"/>
+              </a:solidFill>
+              <a:latin typeface="Times New Roman" panose="02020603050405020304"/>
+              <a:ea typeface="Times New Roman" panose="02020603050405020304"/>
+              <a:cs typeface="Times New Roman" panose="02020603050405020304"/>
+              <a:sym typeface="Times New Roman" panose="02020603050405020304"/>
+            </a:endParaRPr>
+          </a:p>
+        </p:txBody>
+      </p:sp>
       <p:pic>
         <p:nvPicPr>
-          <p:cNvPr id="83" name="Google Shape;83;p18"/>
-          <p:cNvPicPr preferRelativeResize="0"/>
+          <p:cNvPr id="1" name="Picture 0" descr="manager12"/>
+          <p:cNvPicPr>
+            <a:picLocks noChangeAspect="1"/>
+          </p:cNvPicPr>
           <p:nvPr/>
         </p:nvPicPr>
         <p:blipFill>
@@ -11268,16 +11516,12 @@
         </p:blipFill>
         <p:spPr>
           <a:xfrm>
-            <a:off x="152400" y="152400"/>
-            <a:ext cx="8763875" cy="4838700"/>
+            <a:off x="199390" y="697865"/>
+            <a:ext cx="8744585" cy="4204335"/>
           </a:xfrm>
           <a:prstGeom prst="rect">
             <a:avLst/>
           </a:prstGeom>
-          <a:noFill/>
-          <a:ln>
-            <a:noFill/>
-          </a:ln>
         </p:spPr>
       </p:pic>
     </p:spTree>
@@ -11317,10 +11561,69 @@
           <a:chExt cx="0" cy="0"/>
         </a:xfrm>
       </p:grpSpPr>
+      <p:sp>
+        <p:nvSpPr>
+          <p:cNvPr id="123" name="Google Shape;123;p25"/>
+          <p:cNvSpPr txBox="1"/>
+          <p:nvPr/>
+        </p:nvSpPr>
+        <p:spPr>
+          <a:xfrm>
+            <a:off x="2793365" y="90170"/>
+            <a:ext cx="2891155" cy="628650"/>
+          </a:xfrm>
+          <a:prstGeom prst="rect">
+            <a:avLst/>
+          </a:prstGeom>
+          <a:noFill/>
+          <a:ln>
+            <a:noFill/>
+          </a:ln>
+        </p:spPr>
+        <p:txBody>
+          <a:bodyPr spcFirstLastPara="1" wrap="square" lIns="91425" tIns="91425" rIns="91425" bIns="91425" anchor="t" anchorCtr="0">
+            <a:noAutofit/>
+          </a:bodyPr>
+          <a:p>
+            <a:pPr marL="0" lvl="0" indent="0" algn="l" rtl="0">
+              <a:spcBef>
+                <a:spcPts val="0"/>
+              </a:spcBef>
+              <a:spcAft>
+                <a:spcPts val="0"/>
+              </a:spcAft>
+              <a:buNone/>
+            </a:pPr>
+            <a:r>
+              <a:rPr lang="en-US" altLang="en-GB" sz="2800">
+                <a:solidFill>
+                  <a:schemeClr val="dk1"/>
+                </a:solidFill>
+                <a:latin typeface="Times New Roman" panose="02020603050405020304"/>
+                <a:ea typeface="Times New Roman" panose="02020603050405020304"/>
+                <a:cs typeface="Times New Roman" panose="02020603050405020304"/>
+                <a:sym typeface="Times New Roman" panose="02020603050405020304"/>
+              </a:rPr>
+              <a:t>Admin Dashboard</a:t>
+            </a:r>
+            <a:endParaRPr lang="en-US" altLang="en-GB" sz="2800">
+              <a:solidFill>
+                <a:schemeClr val="dk1"/>
+              </a:solidFill>
+              <a:latin typeface="Times New Roman" panose="02020603050405020304"/>
+              <a:ea typeface="Times New Roman" panose="02020603050405020304"/>
+              <a:cs typeface="Times New Roman" panose="02020603050405020304"/>
+              <a:sym typeface="Times New Roman" panose="02020603050405020304"/>
+            </a:endParaRPr>
+          </a:p>
+        </p:txBody>
+      </p:sp>
       <p:pic>
         <p:nvPicPr>
-          <p:cNvPr id="88" name="Google Shape;88;p19"/>
-          <p:cNvPicPr preferRelativeResize="0"/>
+          <p:cNvPr id="1" name="Picture 0" descr="admin12"/>
+          <p:cNvPicPr>
+            <a:picLocks noChangeAspect="1"/>
+          </p:cNvPicPr>
           <p:nvPr/>
         </p:nvPicPr>
         <p:blipFill>
@@ -11331,16 +11634,12 @@
         </p:blipFill>
         <p:spPr>
           <a:xfrm>
-            <a:off x="104425" y="121900"/>
-            <a:ext cx="8888676" cy="4899726"/>
+            <a:off x="491490" y="421640"/>
+            <a:ext cx="8218170" cy="4597400"/>
           </a:xfrm>
           <a:prstGeom prst="rect">
             <a:avLst/>
           </a:prstGeom>
-          <a:noFill/>
-          <a:ln>
-            <a:noFill/>
-          </a:ln>
         </p:spPr>
       </p:pic>
     </p:spTree>
@@ -11364,6 +11663,117 @@
 </file>
 
 <file path=ppt/slides/slide8.xml><?xml version="1.0" encoding="utf-8"?>
+<p:sld xmlns:a="http://schemas.openxmlformats.org/drawingml/2006/main" xmlns:r="http://schemas.openxmlformats.org/officeDocument/2006/relationships" xmlns:p="http://schemas.openxmlformats.org/presentationml/2006/main">
+  <p:cSld>
+    <p:spTree>
+      <p:nvGrpSpPr>
+        <p:cNvPr id="1" name=""/>
+        <p:cNvGrpSpPr/>
+        <p:nvPr/>
+      </p:nvGrpSpPr>
+      <p:grpSpPr/>
+      <p:sp>
+        <p:nvSpPr>
+          <p:cNvPr id="93" name="Google Shape;93;p20"/>
+          <p:cNvSpPr txBox="1"/>
+          <p:nvPr/>
+        </p:nvSpPr>
+        <p:spPr>
+          <a:xfrm>
+            <a:off x="2698750" y="93980"/>
+            <a:ext cx="3242945" cy="628650"/>
+          </a:xfrm>
+          <a:prstGeom prst="rect">
+            <a:avLst/>
+          </a:prstGeom>
+          <a:noFill/>
+          <a:ln>
+            <a:noFill/>
+          </a:ln>
+        </p:spPr>
+        <p:txBody>
+          <a:bodyPr spcFirstLastPara="1" wrap="square" lIns="91425" tIns="91425" rIns="91425" bIns="91425" anchor="t" anchorCtr="0">
+            <a:noAutofit/>
+          </a:bodyPr>
+          <a:p>
+            <a:pPr marL="0" lvl="0" indent="0" algn="l" rtl="0">
+              <a:spcBef>
+                <a:spcPts val="0"/>
+              </a:spcBef>
+              <a:spcAft>
+                <a:spcPts val="0"/>
+              </a:spcAft>
+              <a:buNone/>
+            </a:pPr>
+            <a:r>
+              <a:rPr lang="en-US" altLang="en-GB" sz="2800">
+                <a:solidFill>
+                  <a:schemeClr val="dk1"/>
+                </a:solidFill>
+                <a:latin typeface="Times New Roman" panose="02020603050405020304"/>
+                <a:ea typeface="Times New Roman" panose="02020603050405020304"/>
+                <a:cs typeface="Times New Roman" panose="02020603050405020304"/>
+                <a:sym typeface="Times New Roman" panose="02020603050405020304"/>
+              </a:rPr>
+              <a:t>Session Management</a:t>
+            </a:r>
+            <a:endParaRPr lang="en-US" altLang="en-GB" sz="2800">
+              <a:solidFill>
+                <a:schemeClr val="dk1"/>
+              </a:solidFill>
+              <a:latin typeface="Times New Roman" panose="02020603050405020304"/>
+              <a:ea typeface="Times New Roman" panose="02020603050405020304"/>
+              <a:cs typeface="Times New Roman" panose="02020603050405020304"/>
+              <a:sym typeface="Times New Roman" panose="02020603050405020304"/>
+            </a:endParaRPr>
+          </a:p>
+        </p:txBody>
+      </p:sp>
+      <p:pic>
+        <p:nvPicPr>
+          <p:cNvPr id="6" name="Picture 5" descr="session2"/>
+          <p:cNvPicPr>
+            <a:picLocks noChangeAspect="1"/>
+          </p:cNvPicPr>
+          <p:nvPr/>
+        </p:nvPicPr>
+        <p:blipFill>
+          <a:blip r:embed="rId1"/>
+          <a:stretch>
+            <a:fillRect/>
+          </a:stretch>
+        </p:blipFill>
+        <p:spPr>
+          <a:xfrm>
+            <a:off x="114300" y="855345"/>
+            <a:ext cx="8934450" cy="4042410"/>
+          </a:xfrm>
+          <a:prstGeom prst="rect">
+            <a:avLst/>
+          </a:prstGeom>
+        </p:spPr>
+      </p:pic>
+    </p:spTree>
+  </p:cSld>
+  <p:clrMapOvr>
+    <a:masterClrMapping/>
+  </p:clrMapOvr>
+  <mc:AlternateContent xmlns:mc="http://schemas.openxmlformats.org/markup-compatibility/2006">
+    <mc:Choice xmlns:p14="http://schemas.microsoft.com/office/powerpoint/2010/main" Requires="p14">
+      <p:transition spd="slow" p14:dur="1100">
+        <p14:gallery dir="l"/>
+      </p:transition>
+    </mc:Choice>
+    <mc:Fallback>
+      <p:transition spd="slow">
+        <p:fade/>
+      </p:transition>
+    </mc:Fallback>
+  </mc:AlternateContent>
+</p:sld>
+</file>
+
+<file path=ppt/slides/slide9.xml><?xml version="1.0" encoding="utf-8"?>
 <p:sld xmlns:a="http://schemas.openxmlformats.org/drawingml/2006/main" xmlns:r="http://schemas.openxmlformats.org/officeDocument/2006/relationships" xmlns:p="http://schemas.openxmlformats.org/presentationml/2006/main">
   <p:cSld>
     <p:spTree>
@@ -11454,139 +11864,6 @@
           <a:xfrm>
             <a:off x="1190400" y="728050"/>
             <a:ext cx="6441250" cy="4051150"/>
-          </a:xfrm>
-          <a:prstGeom prst="rect">
-            <a:avLst/>
-          </a:prstGeom>
-          <a:noFill/>
-          <a:ln>
-            <a:noFill/>
-          </a:ln>
-        </p:spPr>
-      </p:pic>
-    </p:spTree>
-  </p:cSld>
-  <p:clrMapOvr>
-    <a:masterClrMapping/>
-  </p:clrMapOvr>
-  <mc:AlternateContent xmlns:mc="http://schemas.openxmlformats.org/markup-compatibility/2006">
-    <mc:Choice xmlns:p14="http://schemas.microsoft.com/office/powerpoint/2010/main" Requires="p14">
-      <p:transition spd="slow" p14:dur="1100">
-        <p14:gallery dir="l"/>
-      </p:transition>
-    </mc:Choice>
-    <mc:Fallback>
-      <p:transition spd="slow">
-        <p:fade/>
-      </p:transition>
-    </mc:Fallback>
-  </mc:AlternateContent>
-</p:sld>
-</file>
-
-<file path=ppt/slides/slide9.xml><?xml version="1.0" encoding="utf-8"?>
-<p:sld xmlns:a="http://schemas.openxmlformats.org/drawingml/2006/main" xmlns:r="http://schemas.openxmlformats.org/officeDocument/2006/relationships" xmlns:p="http://schemas.openxmlformats.org/presentationml/2006/main">
-  <p:cSld>
-    <p:spTree>
-      <p:nvGrpSpPr>
-        <p:cNvPr id="98" name="Shape 98"/>
-        <p:cNvGrpSpPr/>
-        <p:nvPr/>
-      </p:nvGrpSpPr>
-      <p:grpSpPr>
-        <a:xfrm>
-          <a:off x="0" y="0"/>
-          <a:ext cx="0" cy="0"/>
-          <a:chOff x="0" y="0"/>
-          <a:chExt cx="0" cy="0"/>
-        </a:xfrm>
-      </p:grpSpPr>
-      <p:sp>
-        <p:nvSpPr>
-          <p:cNvPr id="99" name="Google Shape;99;p21"/>
-          <p:cNvSpPr txBox="1"/>
-          <p:nvPr/>
-        </p:nvSpPr>
-        <p:spPr>
-          <a:xfrm>
-            <a:off x="2100188" y="108750"/>
-            <a:ext cx="4667400" cy="628800"/>
-          </a:xfrm>
-          <a:prstGeom prst="rect">
-            <a:avLst/>
-          </a:prstGeom>
-          <a:noFill/>
-          <a:ln>
-            <a:noFill/>
-          </a:ln>
-        </p:spPr>
-        <p:txBody>
-          <a:bodyPr spcFirstLastPara="1" wrap="square" lIns="91425" tIns="91425" rIns="91425" bIns="91425" anchor="t" anchorCtr="0">
-            <a:noAutofit/>
-          </a:bodyPr>
-          <a:lstStyle/>
-          <a:p>
-            <a:pPr marL="0" lvl="0" indent="0" algn="l" rtl="0">
-              <a:spcBef>
-                <a:spcPts val="0"/>
-              </a:spcBef>
-              <a:spcAft>
-                <a:spcPts val="0"/>
-              </a:spcAft>
-              <a:buNone/>
-            </a:pPr>
-            <a:r>
-              <a:rPr lang="en-GB" sz="2800">
-                <a:solidFill>
-                  <a:schemeClr val="dk1"/>
-                </a:solidFill>
-                <a:latin typeface="Times New Roman" panose="02020603050405020304"/>
-                <a:ea typeface="Times New Roman" panose="02020603050405020304"/>
-                <a:cs typeface="Times New Roman" panose="02020603050405020304"/>
-                <a:sym typeface="Times New Roman" panose="02020603050405020304"/>
-              </a:rPr>
-              <a:t>Reimbursement_request</a:t>
-            </a:r>
-            <a:r>
-              <a:rPr lang="en-GB" sz="2800">
-                <a:solidFill>
-                  <a:schemeClr val="dk1"/>
-                </a:solidFill>
-                <a:latin typeface="Times New Roman" panose="02020603050405020304"/>
-                <a:ea typeface="Times New Roman" panose="02020603050405020304"/>
-                <a:cs typeface="Times New Roman" panose="02020603050405020304"/>
-                <a:sym typeface="Times New Roman" panose="02020603050405020304"/>
-              </a:rPr>
-              <a:t> Model</a:t>
-            </a:r>
-            <a:endParaRPr sz="2800">
-              <a:solidFill>
-                <a:schemeClr val="dk1"/>
-              </a:solidFill>
-              <a:latin typeface="Times New Roman" panose="02020603050405020304"/>
-              <a:ea typeface="Times New Roman" panose="02020603050405020304"/>
-              <a:cs typeface="Times New Roman" panose="02020603050405020304"/>
-              <a:sym typeface="Times New Roman" panose="02020603050405020304"/>
-            </a:endParaRPr>
-          </a:p>
-        </p:txBody>
-      </p:sp>
-      <p:pic>
-        <p:nvPicPr>
-          <p:cNvPr id="100" name="Google Shape;100;p21"/>
-          <p:cNvPicPr preferRelativeResize="0"/>
-          <p:nvPr/>
-        </p:nvPicPr>
-        <p:blipFill>
-          <a:blip r:embed="rId1"/>
-          <a:stretch>
-            <a:fillRect/>
-          </a:stretch>
-        </p:blipFill>
-        <p:spPr>
-          <a:xfrm>
-            <a:off x="1030075" y="873625"/>
-            <a:ext cx="6943724" cy="4051150"/>
           </a:xfrm>
           <a:prstGeom prst="rect">
             <a:avLst/>

</xml_diff>